<commit_message>
Final edits to presentation and report.
</commit_message>
<xml_diff>
--- a/Project0/Reports/Project 0 Presentation.pptx
+++ b/Project0/Reports/Project 0 Presentation.pptx
@@ -342,7 +342,7 @@
           <a:p>
             <a:fld id="{A887B056-B08C-455C-83BC-8337B7A7C509}" type="datetimeFigureOut">
               <a:rPr lang="en-US" smtClean="0"/>
-              <a:t>9/11/2017</a:t>
+              <a:t>9/12/2017</a:t>
             </a:fld>
             <a:endParaRPr lang="en-US"/>
           </a:p>
@@ -512,7 +512,7 @@
           <a:p>
             <a:fld id="{A887B056-B08C-455C-83BC-8337B7A7C509}" type="datetimeFigureOut">
               <a:rPr lang="en-US" smtClean="0"/>
-              <a:t>9/11/2017</a:t>
+              <a:t>9/12/2017</a:t>
             </a:fld>
             <a:endParaRPr lang="en-US"/>
           </a:p>
@@ -692,7 +692,7 @@
           <a:p>
             <a:fld id="{A887B056-B08C-455C-83BC-8337B7A7C509}" type="datetimeFigureOut">
               <a:rPr lang="en-US" smtClean="0"/>
-              <a:t>9/11/2017</a:t>
+              <a:t>9/12/2017</a:t>
             </a:fld>
             <a:endParaRPr lang="en-US"/>
           </a:p>
@@ -862,7 +862,7 @@
           <a:p>
             <a:fld id="{A887B056-B08C-455C-83BC-8337B7A7C509}" type="datetimeFigureOut">
               <a:rPr lang="en-US" smtClean="0"/>
-              <a:t>9/11/2017</a:t>
+              <a:t>9/12/2017</a:t>
             </a:fld>
             <a:endParaRPr lang="en-US"/>
           </a:p>
@@ -1120,7 +1120,7 @@
           <a:p>
             <a:fld id="{A887B056-B08C-455C-83BC-8337B7A7C509}" type="datetimeFigureOut">
               <a:rPr lang="en-US" smtClean="0"/>
-              <a:t>9/11/2017</a:t>
+              <a:t>9/12/2017</a:t>
             </a:fld>
             <a:endParaRPr lang="en-US"/>
           </a:p>
@@ -1408,7 +1408,7 @@
           <a:p>
             <a:fld id="{A887B056-B08C-455C-83BC-8337B7A7C509}" type="datetimeFigureOut">
               <a:rPr lang="en-US" smtClean="0"/>
-              <a:t>9/11/2017</a:t>
+              <a:t>9/12/2017</a:t>
             </a:fld>
             <a:endParaRPr lang="en-US"/>
           </a:p>
@@ -1850,7 +1850,7 @@
           <a:p>
             <a:fld id="{A887B056-B08C-455C-83BC-8337B7A7C509}" type="datetimeFigureOut">
               <a:rPr lang="en-US" smtClean="0"/>
-              <a:t>9/11/2017</a:t>
+              <a:t>9/12/2017</a:t>
             </a:fld>
             <a:endParaRPr lang="en-US"/>
           </a:p>
@@ -1968,7 +1968,7 @@
           <a:p>
             <a:fld id="{A887B056-B08C-455C-83BC-8337B7A7C509}" type="datetimeFigureOut">
               <a:rPr lang="en-US" smtClean="0"/>
-              <a:t>9/11/2017</a:t>
+              <a:t>9/12/2017</a:t>
             </a:fld>
             <a:endParaRPr lang="en-US"/>
           </a:p>
@@ -2063,7 +2063,7 @@
           <a:p>
             <a:fld id="{A887B056-B08C-455C-83BC-8337B7A7C509}" type="datetimeFigureOut">
               <a:rPr lang="en-US" smtClean="0"/>
-              <a:t>9/11/2017</a:t>
+              <a:t>9/12/2017</a:t>
             </a:fld>
             <a:endParaRPr lang="en-US"/>
           </a:p>
@@ -2351,7 +2351,7 @@
           <a:p>
             <a:fld id="{A887B056-B08C-455C-83BC-8337B7A7C509}" type="datetimeFigureOut">
               <a:rPr lang="en-US" smtClean="0"/>
-              <a:t>9/11/2017</a:t>
+              <a:t>9/12/2017</a:t>
             </a:fld>
             <a:endParaRPr lang="en-US"/>
           </a:p>
@@ -2624,7 +2624,7 @@
           <a:p>
             <a:fld id="{A887B056-B08C-455C-83BC-8337B7A7C509}" type="datetimeFigureOut">
               <a:rPr lang="en-US" smtClean="0"/>
-              <a:t>9/11/2017</a:t>
+              <a:t>9/12/2017</a:t>
             </a:fld>
             <a:endParaRPr lang="en-US"/>
           </a:p>
@@ -2921,7 +2921,7 @@
           <a:p>
             <a:fld id="{A887B056-B08C-455C-83BC-8337B7A7C509}" type="datetimeFigureOut">
               <a:rPr lang="en-US" smtClean="0"/>
-              <a:t>9/11/2017</a:t>
+              <a:t>9/12/2017</a:t>
             </a:fld>
             <a:endParaRPr lang="en-US"/>
           </a:p>
@@ -3555,7 +3555,15 @@
             </a:r>
             <a:r>
               <a:rPr lang="en-US" sz="3200" dirty="0" smtClean="0"/>
-              <a:t> Does application of a new gel for treatment gum disease result in (1) lower average pocket depth and (2) attachment loss after 1 year?</a:t>
+              <a:t> Does application of a new gel for treatment gum disease result in (1) lower average pocket depth and (2</a:t>
+            </a:r>
+            <a:r>
+              <a:rPr lang="en-US" sz="3200" dirty="0" smtClean="0"/>
+              <a:t>) lower </a:t>
+            </a:r>
+            <a:r>
+              <a:rPr lang="en-US" sz="3200" dirty="0" smtClean="0"/>
+              <a:t>attachment loss after 1 year?</a:t>
             </a:r>
           </a:p>
           <a:p>
@@ -3571,15 +3579,7 @@
             </a:r>
             <a:r>
               <a:rPr lang="en-US" sz="3200" dirty="0" smtClean="0"/>
-              <a:t> Treatment will result in (1) lower average pocket depth and (2) </a:t>
-            </a:r>
-            <a:r>
-              <a:rPr lang="en-US" sz="3200" dirty="0" smtClean="0"/>
-              <a:t>lower attachment </a:t>
-            </a:r>
-            <a:r>
-              <a:rPr lang="en-US" sz="3200" dirty="0" smtClean="0"/>
-              <a:t>loss after 1 year compared to the control and placebo groups</a:t>
+              <a:t> Treatment will result in (1) lower average pocket depth and (2) lower attachment loss after 1 year compared to the control and placebo groups</a:t>
             </a:r>
             <a:r>
               <a:rPr lang="en-US" dirty="0" smtClean="0"/>
@@ -3655,13 +3655,13 @@
         </p:nvSpPr>
         <p:spPr>
           <a:xfrm>
-            <a:off x="3609109" y="1459778"/>
-            <a:ext cx="9894456" cy="4676775"/>
+            <a:off x="3564775" y="836815"/>
+            <a:ext cx="9894456" cy="5852159"/>
           </a:xfrm>
         </p:spPr>
         <p:txBody>
           <a:bodyPr>
-            <a:normAutofit fontScale="92500" lnSpcReduction="20000"/>
+            <a:normAutofit/>
           </a:bodyPr>
           <a:lstStyle/>
           <a:p>
@@ -3730,13 +3730,25 @@
             <a:pPr lvl="1"/>
             <a:r>
               <a:rPr lang="en-US" sz="2800" dirty="0" smtClean="0"/>
-              <a:t>Not included in analysis, since trial was randomized </a:t>
+              <a:t>Not included </a:t>
+            </a:r>
+            <a:r>
+              <a:rPr lang="en-US" sz="2800" dirty="0" smtClean="0"/>
+              <a:t>in models </a:t>
+            </a:r>
+            <a:r>
+              <a:rPr lang="en-US" sz="2800" dirty="0" smtClean="0"/>
+              <a:t>since trial was randomized </a:t>
             </a:r>
           </a:p>
           <a:p>
             <a:r>
               <a:rPr lang="en-US" sz="3200" dirty="0" smtClean="0"/>
-              <a:t>Outcomes</a:t>
+              <a:t>Clinical o</a:t>
+            </a:r>
+            <a:r>
+              <a:rPr lang="en-US" sz="3200" dirty="0" smtClean="0"/>
+              <a:t>utcomes</a:t>
             </a:r>
             <a:endParaRPr lang="en-US" sz="3200" dirty="0"/>
           </a:p>
@@ -3843,8 +3855,8 @@
         </p:nvSpPr>
         <p:spPr>
           <a:xfrm>
-            <a:off x="3006437" y="1570615"/>
-            <a:ext cx="10515600" cy="4351338"/>
+            <a:off x="3006437" y="1310149"/>
+            <a:ext cx="10515600" cy="4708266"/>
           </a:xfrm>
         </p:spPr>
         <p:txBody>
@@ -3862,12 +3874,20 @@
           <a:p>
             <a:pPr lvl="1"/>
             <a:r>
+              <a:rPr lang="en-US" sz="3200" dirty="0" smtClean="0"/>
+              <a:t>Model o</a:t>
+            </a:r>
+            <a:r>
+              <a:rPr lang="en-US" sz="3200" dirty="0" smtClean="0"/>
+              <a:t>utcome</a:t>
+            </a:r>
+            <a:r>
               <a:rPr lang="en-US" sz="3200" dirty="0"/>
-              <a:t>Outcome: difference in dental measurement </a:t>
+              <a:t>: difference in dental </a:t>
             </a:r>
             <a:r>
               <a:rPr lang="en-US" sz="3200" dirty="0" smtClean="0"/>
-              <a:t>                  from </a:t>
+              <a:t>                               measurement from </a:t>
             </a:r>
             <a:r>
               <a:rPr lang="en-US" sz="3200" dirty="0"/>
@@ -3941,30 +3961,116 @@
           <a:chExt cx="0" cy="0"/>
         </a:xfrm>
       </p:grpSpPr>
-      <p:sp>
-        <p:nvSpPr>
-          <p:cNvPr id="2" name="Title 1"/>
-          <p:cNvSpPr>
-            <a:spLocks noGrp="1"/>
-          </p:cNvSpPr>
-          <p:nvPr>
-            <p:ph type="title"/>
-          </p:nvPr>
-        </p:nvSpPr>
-        <p:spPr/>
-        <p:txBody>
-          <a:bodyPr/>
-          <a:lstStyle/>
-          <a:p>
-            <a:pPr algn="ctr"/>
-            <a:r>
-              <a:rPr lang="en-US" dirty="0" smtClean="0"/>
-              <a:t>Outcome 1: Difference in pocket depth</a:t>
-            </a:r>
-            <a:endParaRPr lang="en-US" dirty="0"/>
-          </a:p>
-        </p:txBody>
-      </p:sp>
+      <mc:AlternateContent xmlns:mc="http://schemas.openxmlformats.org/markup-compatibility/2006">
+        <mc:Choice xmlns:a14="http://schemas.microsoft.com/office/drawing/2010/main" Requires="a14">
+          <p:sp>
+            <p:nvSpPr>
+              <p:cNvPr id="2" name="Title 1"/>
+              <p:cNvSpPr>
+                <a:spLocks noGrp="1"/>
+              </p:cNvSpPr>
+              <p:nvPr>
+                <p:ph type="title"/>
+              </p:nvPr>
+            </p:nvSpPr>
+            <p:spPr/>
+            <p:txBody>
+              <a:bodyPr/>
+              <a:lstStyle/>
+              <a:p>
+                <a:pPr algn="ctr"/>
+                <a:r>
+                  <a:rPr lang="en-US" dirty="0" smtClean="0"/>
+                  <a:t>Outcome 1: Difference in pocket depth</a:t>
+                </a:r>
+                <a:br>
+                  <a:rPr lang="en-US" dirty="0" smtClean="0"/>
+                </a:br>
+                <a:r>
+                  <a:rPr lang="en-US" dirty="0" smtClean="0"/>
+                  <a:t/>
+                </a:r>
+                <a:br>
+                  <a:rPr lang="en-US" dirty="0" smtClean="0"/>
+                </a:br>
+                <a:r>
+                  <a:rPr lang="en-US" sz="2800" dirty="0" smtClean="0"/>
+                  <a:t>(</a:t>
+                </a:r>
+                <a14:m>
+                  <m:oMath xmlns:m="http://schemas.openxmlformats.org/officeDocument/2006/math">
+                    <m:sSub>
+                      <m:sSubPr>
+                        <m:ctrlPr>
+                          <a:rPr lang="en-US" sz="2800" b="0" i="1" smtClean="0">
+                            <a:latin typeface="Cambria Math" panose="02040503050406030204" pitchFamily="18" charset="0"/>
+                          </a:rPr>
+                        </m:ctrlPr>
+                      </m:sSubPr>
+                      <m:e>
+                        <m:r>
+                          <a:rPr lang="en-US" sz="2800" b="0" i="1" smtClean="0">
+                            <a:latin typeface="Cambria Math" panose="02040503050406030204" pitchFamily="18" charset="0"/>
+                          </a:rPr>
+                          <m:t>𝜇</m:t>
+                        </m:r>
+                      </m:e>
+                      <m:sub>
+                        <m:r>
+                          <a:rPr lang="en-US" sz="2800" b="0" i="1" smtClean="0">
+                            <a:latin typeface="Cambria Math" panose="02040503050406030204" pitchFamily="18" charset="0"/>
+                          </a:rPr>
+                          <m:t>𝑑𝑖𝑓𝑓</m:t>
+                        </m:r>
+                      </m:sub>
+                    </m:sSub>
+                    <m:r>
+                      <a:rPr lang="en-US" sz="2800" b="0" i="1" smtClean="0">
+                        <a:latin typeface="Cambria Math" panose="02040503050406030204" pitchFamily="18" charset="0"/>
+                      </a:rPr>
+                      <m:t>=−0.294)</m:t>
+                    </m:r>
+                  </m:oMath>
+                </a14:m>
+                <a:endParaRPr lang="en-US" sz="2800" dirty="0"/>
+              </a:p>
+            </p:txBody>
+          </p:sp>
+        </mc:Choice>
+        <mc:Fallback>
+          <p:sp>
+            <p:nvSpPr>
+              <p:cNvPr id="2" name="Title 1"/>
+              <p:cNvSpPr>
+                <a:spLocks noGrp="1" noRot="1" noChangeAspect="1" noMove="1" noResize="1" noEditPoints="1" noAdjustHandles="1" noChangeArrowheads="1" noChangeShapeType="1" noTextEdit="1"/>
+              </p:cNvSpPr>
+              <p:nvPr>
+                <p:ph type="title"/>
+              </p:nvPr>
+            </p:nvSpPr>
+            <p:spPr>
+              <a:blipFill>
+                <a:blip r:embed="rId2"/>
+                <a:stretch>
+                  <a:fillRect l="-207" r="-1446"/>
+                </a:stretch>
+              </a:blipFill>
+            </p:spPr>
+            <p:txBody>
+              <a:bodyPr/>
+              <a:lstStyle/>
+              <a:p>
+                <a:r>
+                  <a:rPr lang="en-US">
+                    <a:noFill/>
+                  </a:rPr>
+                  <a:t> </a:t>
+                </a:r>
+              </a:p>
+            </p:txBody>
+          </p:sp>
+        </mc:Fallback>
+      </mc:AlternateContent>
       <p:graphicFrame>
         <p:nvGraphicFramePr>
           <p:cNvPr id="4" name="Content Placeholder 3"/>
@@ -4988,8 +5094,8 @@
         </p:nvSpPr>
         <p:spPr>
           <a:xfrm>
-            <a:off x="10187709" y="4627416"/>
-            <a:ext cx="1246909" cy="775855"/>
+            <a:off x="10258594" y="4685624"/>
+            <a:ext cx="1176024" cy="777684"/>
           </a:xfrm>
           <a:prstGeom prst="rect">
             <a:avLst/>
@@ -5056,30 +5162,122 @@
           <a:chExt cx="0" cy="0"/>
         </a:xfrm>
       </p:grpSpPr>
-      <p:sp>
-        <p:nvSpPr>
-          <p:cNvPr id="2" name="Title 1"/>
-          <p:cNvSpPr>
-            <a:spLocks noGrp="1"/>
-          </p:cNvSpPr>
-          <p:nvPr>
-            <p:ph type="title"/>
-          </p:nvPr>
-        </p:nvSpPr>
-        <p:spPr/>
-        <p:txBody>
-          <a:bodyPr/>
-          <a:lstStyle/>
-          <a:p>
-            <a:pPr algn="ctr"/>
-            <a:r>
-              <a:rPr lang="en-US" dirty="0" smtClean="0"/>
-              <a:t>Outcome 2: Difference in attachment </a:t>
-            </a:r>
-            <a:endParaRPr lang="en-US" dirty="0"/>
-          </a:p>
-        </p:txBody>
-      </p:sp>
+      <mc:AlternateContent xmlns:mc="http://schemas.openxmlformats.org/markup-compatibility/2006">
+        <mc:Choice xmlns:a14="http://schemas.microsoft.com/office/drawing/2010/main" Requires="a14">
+          <p:sp>
+            <p:nvSpPr>
+              <p:cNvPr id="2" name="Title 1"/>
+              <p:cNvSpPr>
+                <a:spLocks noGrp="1"/>
+              </p:cNvSpPr>
+              <p:nvPr>
+                <p:ph type="title"/>
+              </p:nvPr>
+            </p:nvSpPr>
+            <p:spPr/>
+            <p:txBody>
+              <a:bodyPr/>
+              <a:lstStyle/>
+              <a:p>
+                <a:pPr algn="ctr"/>
+                <a:r>
+                  <a:rPr lang="en-US" dirty="0" smtClean="0"/>
+                  <a:t>Outcome 2: Difference in attachment</a:t>
+                </a:r>
+                <a:br>
+                  <a:rPr lang="en-US" dirty="0" smtClean="0"/>
+                </a:br>
+                <a:r>
+                  <a:rPr lang="en-US" dirty="0"/>
+                  <a:t/>
+                </a:r>
+                <a:br>
+                  <a:rPr lang="en-US" dirty="0"/>
+                </a:br>
+                <a14:m>
+                  <m:oMath xmlns:m="http://schemas.openxmlformats.org/officeDocument/2006/math">
+                    <m:r>
+                      <a:rPr lang="en-US" sz="2800" b="0" i="1" smtClean="0">
+                        <a:latin typeface="Cambria Math" panose="02040503050406030204" pitchFamily="18" charset="0"/>
+                      </a:rPr>
+                      <m:t>(</m:t>
+                    </m:r>
+                    <m:sSub>
+                      <m:sSubPr>
+                        <m:ctrlPr>
+                          <a:rPr lang="en-US" sz="2800" b="0" i="1" smtClean="0">
+                            <a:latin typeface="Cambria Math" panose="02040503050406030204" pitchFamily="18" charset="0"/>
+                          </a:rPr>
+                        </m:ctrlPr>
+                      </m:sSubPr>
+                      <m:e>
+                        <m:r>
+                          <a:rPr lang="en-US" sz="2800" b="0" i="1" smtClean="0">
+                            <a:latin typeface="Cambria Math" panose="02040503050406030204" pitchFamily="18" charset="0"/>
+                          </a:rPr>
+                          <m:t>𝜇</m:t>
+                        </m:r>
+                      </m:e>
+                      <m:sub>
+                        <m:r>
+                          <a:rPr lang="en-US" sz="2800" b="0" i="1" smtClean="0">
+                            <a:latin typeface="Cambria Math" panose="02040503050406030204" pitchFamily="18" charset="0"/>
+                          </a:rPr>
+                          <m:t>𝑑𝑖𝑓𝑓</m:t>
+                        </m:r>
+                      </m:sub>
+                    </m:sSub>
+                    <m:r>
+                      <a:rPr lang="en-US" sz="2800" b="0" i="1" smtClean="0">
+                        <a:latin typeface="Cambria Math" panose="02040503050406030204" pitchFamily="18" charset="0"/>
+                      </a:rPr>
+                      <m:t>=−0.099)</m:t>
+                    </m:r>
+                  </m:oMath>
+                </a14:m>
+                <a:r>
+                  <a:rPr lang="en-US" sz="2800" dirty="0" smtClean="0"/>
+                  <a:t> </a:t>
+                </a:r>
+                <a:endParaRPr lang="en-US" sz="2800" dirty="0"/>
+              </a:p>
+            </p:txBody>
+          </p:sp>
+        </mc:Choice>
+        <mc:Fallback>
+          <p:sp>
+            <p:nvSpPr>
+              <p:cNvPr id="2" name="Title 1"/>
+              <p:cNvSpPr>
+                <a:spLocks noGrp="1" noRot="1" noChangeAspect="1" noMove="1" noResize="1" noEditPoints="1" noAdjustHandles="1" noChangeArrowheads="1" noChangeShapeType="1" noTextEdit="1"/>
+              </p:cNvSpPr>
+              <p:nvPr>
+                <p:ph type="title"/>
+              </p:nvPr>
+            </p:nvSpPr>
+            <p:spPr>
+              <a:blipFill>
+                <a:blip r:embed="rId2"/>
+                <a:stretch>
+                  <a:fillRect r="-1446"/>
+                </a:stretch>
+              </a:blipFill>
+            </p:spPr>
+            <p:txBody>
+              <a:bodyPr/>
+              <a:lstStyle/>
+              <a:p>
+                <a:r>
+                  <a:rPr lang="en-US">
+                    <a:noFill/>
+                  </a:rPr>
+                  <a:t> </a:t>
+                </a:r>
+              </a:p>
+            </p:txBody>
+          </p:sp>
+        </mc:Fallback>
+      </mc:AlternateContent>
       <p:graphicFrame>
         <p:nvGraphicFramePr>
           <p:cNvPr id="4" name="Content Placeholder 3"/>

</xml_diff>

<commit_message>
Last minute edits, ready to turn in now.
</commit_message>
<xml_diff>
--- a/Project0/Reports/Project 0 Presentation.pptx
+++ b/Project0/Reports/Project 0 Presentation.pptx
@@ -3555,15 +3555,7 @@
             </a:r>
             <a:r>
               <a:rPr lang="en-US" sz="3200" dirty="0" smtClean="0"/>
-              <a:t> Does application of a new gel for treatment gum disease result in (1) lower average pocket depth and (2</a:t>
-            </a:r>
-            <a:r>
-              <a:rPr lang="en-US" sz="3200" dirty="0" smtClean="0"/>
-              <a:t>) lower </a:t>
-            </a:r>
-            <a:r>
-              <a:rPr lang="en-US" sz="3200" dirty="0" smtClean="0"/>
-              <a:t>attachment loss after 1 year?</a:t>
+              <a:t> Does application of a new gel for treatment gum disease result in (1) lower average pocket depth and (2) lower attachment loss after 1 year?</a:t>
             </a:r>
           </a:p>
           <a:p>
@@ -3730,25 +3722,13 @@
             <a:pPr lvl="1"/>
             <a:r>
               <a:rPr lang="en-US" sz="2800" dirty="0" smtClean="0"/>
-              <a:t>Not included </a:t>
-            </a:r>
-            <a:r>
-              <a:rPr lang="en-US" sz="2800" dirty="0" smtClean="0"/>
-              <a:t>in models </a:t>
-            </a:r>
-            <a:r>
-              <a:rPr lang="en-US" sz="2800" dirty="0" smtClean="0"/>
-              <a:t>since trial was randomized </a:t>
+              <a:t>Not included in models since trial was randomized </a:t>
             </a:r>
           </a:p>
           <a:p>
             <a:r>
               <a:rPr lang="en-US" sz="3200" dirty="0" smtClean="0"/>
-              <a:t>Clinical o</a:t>
-            </a:r>
-            <a:r>
-              <a:rPr lang="en-US" sz="3200" dirty="0" smtClean="0"/>
-              <a:t>utcomes</a:t>
+              <a:t>Clinical outcomes</a:t>
             </a:r>
             <a:endParaRPr lang="en-US" sz="3200" dirty="0"/>
           </a:p>
@@ -3875,11 +3855,7 @@
             <a:pPr lvl="1"/>
             <a:r>
               <a:rPr lang="en-US" sz="3200" dirty="0" smtClean="0"/>
-              <a:t>Model o</a:t>
-            </a:r>
-            <a:r>
-              <a:rPr lang="en-US" sz="3200" dirty="0" smtClean="0"/>
-              <a:t>utcome</a:t>
+              <a:t>Model outcome</a:t>
             </a:r>
             <a:r>
               <a:rPr lang="en-US" sz="3200" dirty="0"/>
@@ -3961,8 +3937,8 @@
           <a:chExt cx="0" cy="0"/>
         </a:xfrm>
       </p:grpSpPr>
-      <mc:AlternateContent xmlns:mc="http://schemas.openxmlformats.org/markup-compatibility/2006">
-        <mc:Choice xmlns:a14="http://schemas.microsoft.com/office/drawing/2010/main" Requires="a14">
+      <mc:AlternateContent xmlns:mc="http://schemas.openxmlformats.org/markup-compatibility/2006" xmlns:a14="http://schemas.microsoft.com/office/drawing/2010/main">
+        <mc:Choice Requires="a14">
           <p:sp>
             <p:nvSpPr>
               <p:cNvPr id="2" name="Title 1"/>
@@ -4037,7 +4013,7 @@
             </p:txBody>
           </p:sp>
         </mc:Choice>
-        <mc:Fallback>
+        <mc:Fallback xmlns="">
           <p:sp>
             <p:nvSpPr>
               <p:cNvPr id="2" name="Title 1"/>
@@ -5162,8 +5138,8 @@
           <a:chExt cx="0" cy="0"/>
         </a:xfrm>
       </p:grpSpPr>
-      <mc:AlternateContent xmlns:mc="http://schemas.openxmlformats.org/markup-compatibility/2006">
-        <mc:Choice xmlns:a14="http://schemas.microsoft.com/office/drawing/2010/main" Requires="a14">
+      <mc:AlternateContent xmlns:mc="http://schemas.openxmlformats.org/markup-compatibility/2006" xmlns:a14="http://schemas.microsoft.com/office/drawing/2010/main">
+        <mc:Choice Requires="a14">
           <p:sp>
             <p:nvSpPr>
               <p:cNvPr id="2" name="Title 1"/>
@@ -5244,7 +5220,7 @@
             </p:txBody>
           </p:sp>
         </mc:Choice>
-        <mc:Fallback>
+        <mc:Fallback xmlns="">
           <p:sp>
             <p:nvSpPr>
               <p:cNvPr id="2" name="Title 1"/>
@@ -6487,10 +6463,15 @@
             <p:ph idx="1"/>
           </p:nvPr>
         </p:nvSpPr>
-        <p:spPr/>
+        <p:spPr>
+          <a:xfrm>
+            <a:off x="3869268" y="471055"/>
+            <a:ext cx="7315200" cy="6386945"/>
+          </a:xfrm>
+        </p:spPr>
         <p:txBody>
           <a:bodyPr>
-            <a:normAutofit lnSpcReduction="10000"/>
+            <a:normAutofit/>
           </a:bodyPr>
           <a:lstStyle/>
           <a:p>
@@ -6553,13 +6534,12 @@
             <a:pPr lvl="1"/>
             <a:r>
               <a:rPr lang="en-US" sz="2800" dirty="0" smtClean="0"/>
-              <a:t>Missing 27 outcomes, so sample size was reduced (especially in men in high concentration treatment group)</a:t>
-            </a:r>
-          </a:p>
-          <a:p>
-            <a:pPr marL="457200" lvl="1" indent="0">
-              <a:buNone/>
-            </a:pPr>
+              <a:t>Missing 27 outcomes, so sample size was </a:t>
+            </a:r>
+            <a:r>
+              <a:rPr lang="en-US" sz="2800" dirty="0" smtClean="0"/>
+              <a:t>reduced, especially in men</a:t>
+            </a:r>
             <a:endParaRPr lang="en-US" dirty="0" smtClean="0"/>
           </a:p>
           <a:p>

</xml_diff>